<commit_message>
v2.0 - Assessment 1&2 completed.
</commit_message>
<xml_diff>
--- a/Systems Analysis Assessments.pptx
+++ b/Systems Analysis Assessments.pptx
@@ -248,7 +248,7 @@
           <a:p>
             <a:fld id="{E002B0C6-EC3A-4EF0-ADE0-93603925419E}" type="datetimeFigureOut">
               <a:rPr lang="en-IE" smtClean="0"/>
-              <a:t>04/11/2015</a:t>
+              <a:t>30/11/2015</a:t>
             </a:fld>
             <a:endParaRPr lang="en-IE"/>
           </a:p>
@@ -1117,7 +1117,7 @@
           <a:p>
             <a:fld id="{E002B0C6-EC3A-4EF0-ADE0-93603925419E}" type="datetimeFigureOut">
               <a:rPr lang="en-IE" smtClean="0"/>
-              <a:t>04/11/2015</a:t>
+              <a:t>30/11/2015</a:t>
             </a:fld>
             <a:endParaRPr lang="en-IE"/>
           </a:p>
@@ -1292,7 +1292,7 @@
           <a:p>
             <a:fld id="{E002B0C6-EC3A-4EF0-ADE0-93603925419E}" type="datetimeFigureOut">
               <a:rPr lang="en-IE" smtClean="0"/>
-              <a:t>04/11/2015</a:t>
+              <a:t>30/11/2015</a:t>
             </a:fld>
             <a:endParaRPr lang="en-IE"/>
           </a:p>
@@ -1462,7 +1462,7 @@
           <a:p>
             <a:fld id="{E002B0C6-EC3A-4EF0-ADE0-93603925419E}" type="datetimeFigureOut">
               <a:rPr lang="en-IE" smtClean="0"/>
-              <a:t>04/11/2015</a:t>
+              <a:t>30/11/2015</a:t>
             </a:fld>
             <a:endParaRPr lang="en-IE"/>
           </a:p>
@@ -1672,7 +1672,7 @@
           <a:p>
             <a:fld id="{E002B0C6-EC3A-4EF0-ADE0-93603925419E}" type="datetimeFigureOut">
               <a:rPr lang="en-IE" smtClean="0"/>
-              <a:t>04/11/2015</a:t>
+              <a:t>30/11/2015</a:t>
             </a:fld>
             <a:endParaRPr lang="en-IE"/>
           </a:p>
@@ -2486,7 +2486,7 @@
           <a:p>
             <a:fld id="{E002B0C6-EC3A-4EF0-ADE0-93603925419E}" type="datetimeFigureOut">
               <a:rPr lang="en-IE" smtClean="0"/>
-              <a:t>04/11/2015</a:t>
+              <a:t>30/11/2015</a:t>
             </a:fld>
             <a:endParaRPr lang="en-IE"/>
           </a:p>
@@ -2722,7 +2722,7 @@
           <a:p>
             <a:fld id="{E002B0C6-EC3A-4EF0-ADE0-93603925419E}" type="datetimeFigureOut">
               <a:rPr lang="en-IE" smtClean="0"/>
-              <a:t>04/11/2015</a:t>
+              <a:t>30/11/2015</a:t>
             </a:fld>
             <a:endParaRPr lang="en-IE"/>
           </a:p>
@@ -3045,7 +3045,7 @@
           <a:p>
             <a:fld id="{E002B0C6-EC3A-4EF0-ADE0-93603925419E}" type="datetimeFigureOut">
               <a:rPr lang="en-IE" smtClean="0"/>
-              <a:t>04/11/2015</a:t>
+              <a:t>30/11/2015</a:t>
             </a:fld>
             <a:endParaRPr lang="en-IE"/>
           </a:p>
@@ -3135,7 +3135,7 @@
           <a:p>
             <a:fld id="{E002B0C6-EC3A-4EF0-ADE0-93603925419E}" type="datetimeFigureOut">
               <a:rPr lang="en-IE" smtClean="0"/>
-              <a:t>04/11/2015</a:t>
+              <a:t>30/11/2015</a:t>
             </a:fld>
             <a:endParaRPr lang="en-IE"/>
           </a:p>
@@ -3652,7 +3652,7 @@
           <a:p>
             <a:fld id="{E002B0C6-EC3A-4EF0-ADE0-93603925419E}" type="datetimeFigureOut">
               <a:rPr lang="en-IE" smtClean="0"/>
-              <a:t>04/11/2015</a:t>
+              <a:t>30/11/2015</a:t>
             </a:fld>
             <a:endParaRPr lang="en-IE"/>
           </a:p>
@@ -4163,7 +4163,7 @@
           <a:p>
             <a:fld id="{E002B0C6-EC3A-4EF0-ADE0-93603925419E}" type="datetimeFigureOut">
               <a:rPr lang="en-IE" smtClean="0"/>
-              <a:t>04/11/2015</a:t>
+              <a:t>30/11/2015</a:t>
             </a:fld>
             <a:endParaRPr lang="en-IE"/>
           </a:p>
@@ -4408,7 +4408,7 @@
           <a:p>
             <a:fld id="{E002B0C6-EC3A-4EF0-ADE0-93603925419E}" type="datetimeFigureOut">
               <a:rPr lang="en-IE" smtClean="0"/>
-              <a:t>04/11/2015</a:t>
+              <a:t>30/11/2015</a:t>
             </a:fld>
             <a:endParaRPr lang="en-IE"/>
           </a:p>
@@ -5513,6 +5513,9 @@
           </a:p>
           <a:p>
             <a:pPr marL="822960" lvl="1" indent="-457200">
+              <a:spcBef>
+                <a:spcPts val="1200"/>
+              </a:spcBef>
               <a:buFont typeface="+mj-lt"/>
               <a:buAutoNum type="alphaLcParenR"/>
             </a:pPr>
@@ -5536,9 +5539,29 @@
               <a:rPr lang="en-GB" dirty="0" smtClean="0"/>
               <a:t>investigation </a:t>
             </a:r>
+            <a:endParaRPr lang="en-GB" dirty="0" smtClean="0"/>
+          </a:p>
+          <a:p>
+            <a:pPr marL="1438275" lvl="2" indent="-182563">
+              <a:spcBef>
+                <a:spcPts val="1200"/>
+              </a:spcBef>
+            </a:pPr>
+            <a:r>
+              <a:rPr lang="en-GB" dirty="0" smtClean="0"/>
+              <a:t>DFD</a:t>
+            </a:r>
+            <a:r>
+              <a:rPr lang="en-GB" dirty="0" smtClean="0"/>
+              <a:t> Level 0, Level 1 and Level 2 </a:t>
+            </a:r>
+            <a:endParaRPr lang="en-GB" dirty="0" smtClean="0"/>
           </a:p>
           <a:p>
             <a:pPr marL="822960" lvl="1" indent="-457200">
+              <a:spcBef>
+                <a:spcPts val="1200"/>
+              </a:spcBef>
               <a:buFont typeface="+mj-lt"/>
               <a:buAutoNum type="alphaLcParenR"/>
             </a:pPr>
@@ -5552,19 +5575,52 @@
             </a:r>
             <a:r>
               <a:rPr lang="en-GB" dirty="0" smtClean="0"/>
-              <a:t>need</a:t>
-            </a:r>
+              <a:t>need </a:t>
+            </a:r>
+          </a:p>
+          <a:p>
+            <a:pPr marL="1438275" lvl="2" indent="-182563">
+              <a:spcBef>
+                <a:spcPts val="1200"/>
+              </a:spcBef>
+            </a:pPr>
+            <a:r>
+              <a:rPr lang="en-GB" dirty="0"/>
+              <a:t>High</a:t>
+            </a:r>
+            <a:r>
+              <a:rPr lang="en-GB" dirty="0" smtClean="0"/>
+              <a:t> Level Requirement Template Completed</a:t>
+            </a:r>
+            <a:endParaRPr lang="en-GB" dirty="0" smtClean="0"/>
           </a:p>
           <a:p>
             <a:pPr marL="822960" lvl="1" indent="-457200">
+              <a:spcBef>
+                <a:spcPts val="1200"/>
+              </a:spcBef>
               <a:buFont typeface="+mj-lt"/>
               <a:buAutoNum type="alphaLcParenR"/>
             </a:pPr>
             <a:r>
               <a:rPr lang="en-GB" dirty="0" smtClean="0"/>
-              <a:t>Evaluate how user and systems requirements have been addressed.</a:t>
-            </a:r>
-            <a:endParaRPr lang="en-IE" dirty="0"/>
+              <a:t>Evaluate how user and systems requirements have been addressed</a:t>
+            </a:r>
+            <a:r>
+              <a:rPr lang="en-GB" dirty="0" smtClean="0"/>
+              <a:t>.</a:t>
+            </a:r>
+          </a:p>
+          <a:p>
+            <a:pPr marL="1438275" lvl="2" indent="-182563">
+              <a:spcBef>
+                <a:spcPts val="1200"/>
+              </a:spcBef>
+            </a:pPr>
+            <a:r>
+              <a:rPr lang="en-GB" dirty="0" smtClean="0"/>
+              <a:t>Feasibility Analysis done &amp; Report produced including Evaluation of Alternatives</a:t>
+            </a:r>
           </a:p>
         </p:txBody>
       </p:sp>

</xml_diff>